<commit_message>
erneute Korrektur der PPT
</commit_message>
<xml_diff>
--- a/documents/marketing/Marketingstrategie - Klassische Medien (5.8).pptx
+++ b/documents/marketing/Marketingstrategie - Klassische Medien (5.8).pptx
@@ -233,11 +233,11 @@
         </c:dLbls>
         <c:marker val="1"/>
         <c:smooth val="0"/>
-        <c:axId val="137297536"/>
-        <c:axId val="138249336"/>
+        <c:axId val="217530800"/>
+        <c:axId val="153025080"/>
       </c:lineChart>
       <c:catAx>
-        <c:axId val="137297536"/>
+        <c:axId val="217530800"/>
         <c:scaling>
           <c:orientation val="minMax"/>
         </c:scaling>
@@ -257,7 +257,7 @@
             <a:endParaRPr lang="de-DE"/>
           </a:p>
         </c:txPr>
-        <c:crossAx val="138249336"/>
+        <c:crossAx val="153025080"/>
         <c:crosses val="autoZero"/>
         <c:auto val="1"/>
         <c:lblAlgn val="ctr"/>
@@ -265,7 +265,7 @@
         <c:noMultiLvlLbl val="1"/>
       </c:catAx>
       <c:valAx>
-        <c:axId val="138249336"/>
+        <c:axId val="153025080"/>
         <c:scaling>
           <c:orientation val="minMax"/>
         </c:scaling>
@@ -276,14 +276,13 @@
         <c:majorTickMark val="out"/>
         <c:minorTickMark val="none"/>
         <c:tickLblPos val="nextTo"/>
-        <c:crossAx val="137297536"/>
+        <c:crossAx val="217530800"/>
         <c:crosses val="autoZero"/>
         <c:crossBetween val="between"/>
       </c:valAx>
     </c:plotArea>
     <c:legend>
       <c:legendPos val="b"/>
-      <c:layout/>
       <c:overlay val="0"/>
     </c:legend>
     <c:plotVisOnly val="1"/>
@@ -4587,33 +4586,22 @@
                 <a:latin typeface="Arial" panose="020B0604020202020204" pitchFamily="34" charset="0"/>
                 <a:cs typeface="Arial" panose="020B0604020202020204" pitchFamily="34" charset="0"/>
               </a:rPr>
-              <a:t>Einfacher Name</a:t>
+              <a:t>Einfacher Name: </a:t>
+            </a:r>
+            <a:r>
+              <a:rPr lang="de-DE" sz="2400" dirty="0" err="1" smtClean="0">
+                <a:latin typeface="Arial" panose="020B0604020202020204" pitchFamily="34" charset="0"/>
+                <a:cs typeface="Arial" panose="020B0604020202020204" pitchFamily="34" charset="0"/>
+              </a:rPr>
+              <a:t>GoHappy</a:t>
             </a:r>
             <a:r>
               <a:rPr lang="de-DE" sz="2400" dirty="0" smtClean="0">
                 <a:latin typeface="Arial" panose="020B0604020202020204" pitchFamily="34" charset="0"/>
                 <a:cs typeface="Arial" panose="020B0604020202020204" pitchFamily="34" charset="0"/>
               </a:rPr>
-              <a:t>: </a:t>
-            </a:r>
-            <a:r>
-              <a:rPr lang="de-DE" sz="2400" dirty="0" err="1" smtClean="0">
-                <a:latin typeface="Arial" panose="020B0604020202020204" pitchFamily="34" charset="0"/>
-                <a:cs typeface="Arial" panose="020B0604020202020204" pitchFamily="34" charset="0"/>
-              </a:rPr>
-              <a:t>GoHappy</a:t>
-            </a:r>
-            <a:r>
-              <a:rPr lang="de-DE" sz="2400" dirty="0" smtClean="0">
-                <a:latin typeface="Arial" panose="020B0604020202020204" pitchFamily="34" charset="0"/>
-                <a:cs typeface="Arial" panose="020B0604020202020204" pitchFamily="34" charset="0"/>
-              </a:rPr>
               <a:t> </a:t>
             </a:r>
-            <a:endParaRPr lang="de-DE" sz="2400" dirty="0" smtClean="0">
-              <a:latin typeface="Arial" panose="020B0604020202020204" pitchFamily="34" charset="0"/>
-              <a:cs typeface="Arial" panose="020B0604020202020204" pitchFamily="34" charset="0"/>
-            </a:endParaRPr>
           </a:p>
           <a:p>
             <a:pPr>
@@ -4660,14 +4648,7 @@
                 <a:latin typeface="Arial" panose="020B0604020202020204" pitchFamily="34" charset="0"/>
                 <a:cs typeface="Arial" panose="020B0604020202020204" pitchFamily="34" charset="0"/>
               </a:rPr>
-              <a:t>T</a:t>
-            </a:r>
-            <a:r>
-              <a:rPr lang="de-DE" sz="2400" dirty="0" err="1" smtClean="0">
-                <a:latin typeface="Arial" panose="020B0604020202020204" pitchFamily="34" charset="0"/>
-                <a:cs typeface="Arial" panose="020B0604020202020204" pitchFamily="34" charset="0"/>
-              </a:rPr>
-              <a:t>ryin</a:t>
+              <a:t>Tryin</a:t>
             </a:r>
             <a:r>
               <a:rPr lang="de-DE" sz="2400" dirty="0" smtClean="0">
@@ -4676,10 +4657,6 @@
               </a:rPr>
               <a:t>‘</a:t>
             </a:r>
-            <a:endParaRPr lang="de-DE" sz="2400" dirty="0" smtClean="0">
-              <a:latin typeface="Arial" panose="020B0604020202020204" pitchFamily="34" charset="0"/>
-              <a:cs typeface="Arial" panose="020B0604020202020204" pitchFamily="34" charset="0"/>
-            </a:endParaRPr>
           </a:p>
           <a:p>
             <a:endParaRPr lang="de-DE" dirty="0"/>
@@ -4822,19 +4799,8 @@
                 <a:latin typeface="Arial" panose="020B0604020202020204" pitchFamily="34" charset="0"/>
                 <a:cs typeface="Arial" panose="020B0604020202020204" pitchFamily="34" charset="0"/>
               </a:rPr>
-              <a:t>möglichen Nutzer wurden </a:t>
-            </a:r>
-            <a:r>
-              <a:rPr lang="de-DE" sz="2400" dirty="0" smtClean="0">
-                <a:latin typeface="Arial" panose="020B0604020202020204" pitchFamily="34" charset="0"/>
-                <a:cs typeface="Arial" panose="020B0604020202020204" pitchFamily="34" charset="0"/>
-              </a:rPr>
-              <a:t>befragt (hauptsächlich Studenten)</a:t>
-            </a:r>
-            <a:endParaRPr lang="de-DE" sz="2400" dirty="0" smtClean="0">
-              <a:latin typeface="Arial" panose="020B0604020202020204" pitchFamily="34" charset="0"/>
-              <a:cs typeface="Arial" panose="020B0604020202020204" pitchFamily="34" charset="0"/>
-            </a:endParaRPr>
+              <a:t>möglichen Nutzer wurden befragt (hauptsächlich Studenten)</a:t>
+            </a:r>
           </a:p>
           <a:p>
             <a:pPr lvl="1">
@@ -8420,33 +8386,22 @@
                 <a:latin typeface="Arial" panose="020B0604020202020204" pitchFamily="34" charset="0"/>
                 <a:cs typeface="Arial" panose="020B0604020202020204" pitchFamily="34" charset="0"/>
               </a:rPr>
-              <a:t>“ ganz schnell </a:t>
+              <a:t>“ ganz schnell eine Route für den Abend mit vielen </a:t>
+            </a:r>
+            <a:r>
+              <a:rPr lang="de-DE" sz="2400" dirty="0" err="1" smtClean="0">
+                <a:latin typeface="Arial" panose="020B0604020202020204" pitchFamily="34" charset="0"/>
+                <a:cs typeface="Arial" panose="020B0604020202020204" pitchFamily="34" charset="0"/>
+              </a:rPr>
+              <a:t>HappyHours</a:t>
             </a:r>
             <a:r>
               <a:rPr lang="de-DE" sz="2400" dirty="0" smtClean="0">
                 <a:latin typeface="Arial" panose="020B0604020202020204" pitchFamily="34" charset="0"/>
                 <a:cs typeface="Arial" panose="020B0604020202020204" pitchFamily="34" charset="0"/>
               </a:rPr>
-              <a:t>eine Route für den Abend mit vielen </a:t>
-            </a:r>
-            <a:r>
-              <a:rPr lang="de-DE" sz="2400" dirty="0" err="1" smtClean="0">
-                <a:latin typeface="Arial" panose="020B0604020202020204" pitchFamily="34" charset="0"/>
-                <a:cs typeface="Arial" panose="020B0604020202020204" pitchFamily="34" charset="0"/>
-              </a:rPr>
-              <a:t>HappyHours</a:t>
-            </a:r>
-            <a:r>
-              <a:rPr lang="de-DE" sz="2400" dirty="0" smtClean="0">
-                <a:latin typeface="Arial" panose="020B0604020202020204" pitchFamily="34" charset="0"/>
-                <a:cs typeface="Arial" panose="020B0604020202020204" pitchFamily="34" charset="0"/>
-              </a:rPr>
               <a:t> geplant werden kann</a:t>
             </a:r>
-            <a:endParaRPr lang="de-DE" sz="2400" dirty="0" smtClean="0">
-              <a:latin typeface="Arial" panose="020B0604020202020204" pitchFamily="34" charset="0"/>
-              <a:cs typeface="Arial" panose="020B0604020202020204" pitchFamily="34" charset="0"/>
-            </a:endParaRPr>
           </a:p>
           <a:p>
             <a:pPr>
@@ -8785,18 +8740,11 @@
               <a:t>Ziel und </a:t>
             </a:r>
             <a:r>
-              <a:rPr lang="de-DE" sz="2400" b="1" dirty="0" err="1" smtClean="0">
-                <a:latin typeface="Arial" panose="020B0604020202020204" pitchFamily="34" charset="0"/>
-                <a:cs typeface="Arial" panose="020B0604020202020204" pitchFamily="34" charset="0"/>
-              </a:rPr>
-              <a:t>Durchfürhung</a:t>
-            </a:r>
-            <a:r>
               <a:rPr lang="de-DE" sz="2400" b="1" dirty="0" smtClean="0">
                 <a:latin typeface="Arial" panose="020B0604020202020204" pitchFamily="34" charset="0"/>
                 <a:cs typeface="Arial" panose="020B0604020202020204" pitchFamily="34" charset="0"/>
               </a:rPr>
-              <a:t> </a:t>
+              <a:t>Durchführung </a:t>
             </a:r>
             <a:endParaRPr lang="de-DE" sz="1800" b="1" dirty="0">
               <a:latin typeface="Arial" panose="020B0604020202020204" pitchFamily="34" charset="0"/>
@@ -9459,10 +9407,6 @@
               </a:rPr>
               <a:t>Vertriebspolitik</a:t>
             </a:r>
-            <a:endParaRPr lang="de-DE" dirty="0" smtClean="0">
-              <a:latin typeface="Arial" panose="020B0604020202020204" pitchFamily="34" charset="0"/>
-              <a:cs typeface="Arial" panose="020B0604020202020204" pitchFamily="34" charset="0"/>
-            </a:endParaRPr>
           </a:p>
           <a:p>
             <a:pPr lvl="1"/>

</xml_diff>

<commit_message>
Erneute Korrektur an PPT
</commit_message>
<xml_diff>
--- a/documents/marketing/Marketingstrategie - Klassische Medien (5.8).pptx
+++ b/documents/marketing/Marketingstrategie - Klassische Medien (5.8).pptx
@@ -233,11 +233,11 @@
         </c:dLbls>
         <c:marker val="1"/>
         <c:smooth val="0"/>
-        <c:axId val="217530800"/>
-        <c:axId val="153025080"/>
+        <c:axId val="136381160"/>
+        <c:axId val="136408136"/>
       </c:lineChart>
       <c:catAx>
-        <c:axId val="217530800"/>
+        <c:axId val="136381160"/>
         <c:scaling>
           <c:orientation val="minMax"/>
         </c:scaling>
@@ -257,7 +257,7 @@
             <a:endParaRPr lang="de-DE"/>
           </a:p>
         </c:txPr>
-        <c:crossAx val="153025080"/>
+        <c:crossAx val="136408136"/>
         <c:crosses val="autoZero"/>
         <c:auto val="1"/>
         <c:lblAlgn val="ctr"/>
@@ -265,7 +265,7 @@
         <c:noMultiLvlLbl val="1"/>
       </c:catAx>
       <c:valAx>
-        <c:axId val="153025080"/>
+        <c:axId val="136408136"/>
         <c:scaling>
           <c:orientation val="minMax"/>
         </c:scaling>
@@ -276,7 +276,7 @@
         <c:majorTickMark val="out"/>
         <c:minorTickMark val="none"/>
         <c:tickLblPos val="nextTo"/>
-        <c:crossAx val="217530800"/>
+        <c:crossAx val="136381160"/>
         <c:crosses val="autoZero"/>
         <c:crossBetween val="between"/>
       </c:valAx>
@@ -8802,26 +8802,9 @@
             </a:endParaRPr>
           </a:p>
           <a:p>
-            <a:r>
-              <a:rPr lang="de-DE" sz="2400" dirty="0">
-                <a:latin typeface="Arial" panose="020B0604020202020204" pitchFamily="34" charset="0"/>
-                <a:cs typeface="Arial" panose="020B0604020202020204" pitchFamily="34" charset="0"/>
-              </a:rPr>
-              <a:t>Implementierung der konkreten </a:t>
-            </a:r>
-            <a:r>
-              <a:rPr lang="de-DE" sz="2400" dirty="0" smtClean="0">
-                <a:latin typeface="Arial" panose="020B0604020202020204" pitchFamily="34" charset="0"/>
-                <a:cs typeface="Arial" panose="020B0604020202020204" pitchFamily="34" charset="0"/>
-              </a:rPr>
-              <a:t>Marketingaktivitäten</a:t>
-            </a:r>
-            <a:endParaRPr lang="de-DE" sz="2400" dirty="0">
-              <a:latin typeface="Arial" panose="020B0604020202020204" pitchFamily="34" charset="0"/>
-              <a:cs typeface="Arial" panose="020B0604020202020204" pitchFamily="34" charset="0"/>
-            </a:endParaRPr>
-          </a:p>
-          <a:p>
+            <a:pPr marL="0" indent="0">
+              <a:buNone/>
+            </a:pPr>
             <a:endParaRPr lang="de-DE" dirty="0"/>
           </a:p>
         </p:txBody>

</xml_diff>